<commit_message>
Rivisto diagrammi UC1, UC2, UC3
</commit_message>
<xml_diff>
--- a/Presentazioni/Presentazioni PB/Presentazione PB.pptx
+++ b/Presentazioni/Presentazioni PB/Presentazione PB.pptx
@@ -123,6 +123,10 @@
     </p:ext>
   </p:extLst>
 </p:presentation>
+</file>
+
+<file path=ppt/revisionInfo.xml><?xml version="1.0" encoding="utf-8"?>
+<p1510:revInfo xmlns:a="http://schemas.openxmlformats.org/drawingml/2006/main" xmlns:r="http://schemas.openxmlformats.org/officeDocument/2006/relationships" xmlns:p1510="http://schemas.microsoft.com/office/powerpoint/2015/10/main"/>
 </file>
 
 <file path=ppt/charts/chart1.xml><?xml version="1.0" encoding="utf-8"?>
@@ -493,6 +497,14 @@
     </c:plotArea>
     <c:legend>
       <c:legendPos val="b"/>
+      <c:legendEntry>
+        <c:idx val="2"/>
+        <c:delete val="1"/>
+      </c:legendEntry>
+      <c:legendEntry>
+        <c:idx val="3"/>
+        <c:delete val="1"/>
+      </c:legendEntry>
       <c:overlay val="0"/>
       <c:spPr>
         <a:noFill/>
@@ -523,6 +535,7 @@
     </c:legend>
     <c:plotVisOnly val="1"/>
     <c:dispBlanksAs val="gap"/>
+    <c:showDLblsOverMax val="0"/>
     <c:extLst>
       <c:ext xmlns:c16r3="http://schemas.microsoft.com/office/drawing/2017/03/chart" uri="{56B9EC1D-385E-4148-901F-78D8002777C0}">
         <c16r3:dataDisplayOptions16>
@@ -530,7 +543,6 @@
         </c16r3:dataDisplayOptions16>
       </c:ext>
     </c:extLst>
-    <c:showDLblsOverMax val="0"/>
   </c:chart>
   <c:spPr>
     <a:gradFill flip="none" rotWithShape="1">
@@ -974,6 +986,14 @@
     </c:plotArea>
     <c:legend>
       <c:legendPos val="b"/>
+      <c:legendEntry>
+        <c:idx val="2"/>
+        <c:delete val="1"/>
+      </c:legendEntry>
+      <c:legendEntry>
+        <c:idx val="3"/>
+        <c:delete val="1"/>
+      </c:legendEntry>
       <c:overlay val="0"/>
       <c:spPr>
         <a:noFill/>
@@ -1004,6 +1024,7 @@
     </c:legend>
     <c:plotVisOnly val="1"/>
     <c:dispBlanksAs val="gap"/>
+    <c:showDLblsOverMax val="0"/>
     <c:extLst>
       <c:ext xmlns:c16r3="http://schemas.microsoft.com/office/drawing/2017/03/chart" uri="{56B9EC1D-385E-4148-901F-78D8002777C0}">
         <c16r3:dataDisplayOptions16>
@@ -1011,7 +1032,6 @@
         </c16r3:dataDisplayOptions16>
       </c:ext>
     </c:extLst>
-    <c:showDLblsOverMax val="0"/>
   </c:chart>
   <c:spPr>
     <a:gradFill flip="none" rotWithShape="1">
@@ -1359,6 +1379,7 @@
     </c:legend>
     <c:plotVisOnly val="1"/>
     <c:dispBlanksAs val="gap"/>
+    <c:showDLblsOverMax val="0"/>
     <c:extLst>
       <c:ext xmlns:c16r3="http://schemas.microsoft.com/office/drawing/2017/03/chart" uri="{56B9EC1D-385E-4148-901F-78D8002777C0}">
         <c16r3:dataDisplayOptions16>
@@ -1366,7 +1387,6 @@
         </c16r3:dataDisplayOptions16>
       </c:ext>
     </c:extLst>
-    <c:showDLblsOverMax val="0"/>
   </c:chart>
   <c:spPr>
     <a:gradFill flip="none" rotWithShape="1">
@@ -1746,6 +1766,7 @@
     </c:legend>
     <c:plotVisOnly val="1"/>
     <c:dispBlanksAs val="gap"/>
+    <c:showDLblsOverMax val="0"/>
     <c:extLst>
       <c:ext xmlns:c16r3="http://schemas.microsoft.com/office/drawing/2017/03/chart" uri="{56B9EC1D-385E-4148-901F-78D8002777C0}">
         <c16r3:dataDisplayOptions16>
@@ -1753,7 +1774,6 @@
         </c16r3:dataDisplayOptions16>
       </c:ext>
     </c:extLst>
-    <c:showDLblsOverMax val="0"/>
   </c:chart>
   <c:spPr>
     <a:gradFill flip="none" rotWithShape="1">
@@ -4088,7 +4108,7 @@
           <a:p>
             <a:fld id="{5CF95FE8-80A6-42EB-B376-7F3BFD602E63}" type="datetimeFigureOut">
               <a:rPr lang="it-IT" smtClean="0"/>
-              <a:t>07/04/2018</a:t>
+              <a:t>08/04/2018</a:t>
             </a:fld>
             <a:endParaRPr lang="it-IT"/>
           </a:p>
@@ -4286,7 +4306,7 @@
           <a:p>
             <a:fld id="{5CF95FE8-80A6-42EB-B376-7F3BFD602E63}" type="datetimeFigureOut">
               <a:rPr lang="it-IT" smtClean="0"/>
-              <a:t>07/04/2018</a:t>
+              <a:t>08/04/2018</a:t>
             </a:fld>
             <a:endParaRPr lang="it-IT"/>
           </a:p>
@@ -4494,7 +4514,7 @@
           <a:p>
             <a:fld id="{5CF95FE8-80A6-42EB-B376-7F3BFD602E63}" type="datetimeFigureOut">
               <a:rPr lang="it-IT" smtClean="0"/>
-              <a:t>07/04/2018</a:t>
+              <a:t>08/04/2018</a:t>
             </a:fld>
             <a:endParaRPr lang="it-IT"/>
           </a:p>
@@ -4692,7 +4712,7 @@
           <a:p>
             <a:fld id="{5CF95FE8-80A6-42EB-B376-7F3BFD602E63}" type="datetimeFigureOut">
               <a:rPr lang="it-IT" smtClean="0"/>
-              <a:t>07/04/2018</a:t>
+              <a:t>08/04/2018</a:t>
             </a:fld>
             <a:endParaRPr lang="it-IT"/>
           </a:p>
@@ -4967,7 +4987,7 @@
           <a:p>
             <a:fld id="{5CF95FE8-80A6-42EB-B376-7F3BFD602E63}" type="datetimeFigureOut">
               <a:rPr lang="it-IT" smtClean="0"/>
-              <a:t>07/04/2018</a:t>
+              <a:t>08/04/2018</a:t>
             </a:fld>
             <a:endParaRPr lang="it-IT"/>
           </a:p>
@@ -5232,7 +5252,7 @@
           <a:p>
             <a:fld id="{5CF95FE8-80A6-42EB-B376-7F3BFD602E63}" type="datetimeFigureOut">
               <a:rPr lang="it-IT" smtClean="0"/>
-              <a:t>07/04/2018</a:t>
+              <a:t>08/04/2018</a:t>
             </a:fld>
             <a:endParaRPr lang="it-IT"/>
           </a:p>
@@ -5644,7 +5664,7 @@
           <a:p>
             <a:fld id="{5CF95FE8-80A6-42EB-B376-7F3BFD602E63}" type="datetimeFigureOut">
               <a:rPr lang="it-IT" smtClean="0"/>
-              <a:t>07/04/2018</a:t>
+              <a:t>08/04/2018</a:t>
             </a:fld>
             <a:endParaRPr lang="it-IT"/>
           </a:p>
@@ -5785,7 +5805,7 @@
           <a:p>
             <a:fld id="{5CF95FE8-80A6-42EB-B376-7F3BFD602E63}" type="datetimeFigureOut">
               <a:rPr lang="it-IT" smtClean="0"/>
-              <a:t>07/04/2018</a:t>
+              <a:t>08/04/2018</a:t>
             </a:fld>
             <a:endParaRPr lang="it-IT"/>
           </a:p>
@@ -5898,7 +5918,7 @@
           <a:p>
             <a:fld id="{5CF95FE8-80A6-42EB-B376-7F3BFD602E63}" type="datetimeFigureOut">
               <a:rPr lang="it-IT" smtClean="0"/>
-              <a:t>07/04/2018</a:t>
+              <a:t>08/04/2018</a:t>
             </a:fld>
             <a:endParaRPr lang="it-IT"/>
           </a:p>
@@ -6209,7 +6229,7 @@
           <a:p>
             <a:fld id="{5CF95FE8-80A6-42EB-B376-7F3BFD602E63}" type="datetimeFigureOut">
               <a:rPr lang="it-IT" smtClean="0"/>
-              <a:t>07/04/2018</a:t>
+              <a:t>08/04/2018</a:t>
             </a:fld>
             <a:endParaRPr lang="it-IT"/>
           </a:p>
@@ -6497,7 +6517,7 @@
           <a:p>
             <a:fld id="{5CF95FE8-80A6-42EB-B376-7F3BFD602E63}" type="datetimeFigureOut">
               <a:rPr lang="it-IT" smtClean="0"/>
-              <a:t>07/04/2018</a:t>
+              <a:t>08/04/2018</a:t>
             </a:fld>
             <a:endParaRPr lang="it-IT"/>
           </a:p>
@@ -6738,7 +6758,7 @@
           <a:p>
             <a:fld id="{5CF95FE8-80A6-42EB-B376-7F3BFD602E63}" type="datetimeFigureOut">
               <a:rPr lang="it-IT" smtClean="0"/>
-              <a:t>07/04/2018</a:t>
+              <a:t>08/04/2018</a:t>
             </a:fld>
             <a:endParaRPr lang="it-IT"/>
           </a:p>

</xml_diff>